<commit_message>
more interfaces; pre-draw small net
</commit_message>
<xml_diff>
--- a/planning/diagrams.pptx
+++ b/planning/diagrams.pptx
@@ -5,14 +5,15 @@
     <p:sldMasterId id="2147483648" r:id="rId1"/>
   </p:sldMasterIdLst>
   <p:notesMasterIdLst>
-    <p:notesMasterId r:id="rId4"/>
+    <p:notesMasterId r:id="rId5"/>
   </p:notesMasterIdLst>
   <p:handoutMasterIdLst>
-    <p:handoutMasterId r:id="rId5"/>
+    <p:handoutMasterId r:id="rId6"/>
   </p:handoutMasterIdLst>
   <p:sldIdLst>
     <p:sldId id="392" r:id="rId2"/>
     <p:sldId id="393" r:id="rId3"/>
+    <p:sldId id="394" r:id="rId4"/>
   </p:sldIdLst>
   <p:sldSz cx="9144000" cy="6858000" type="screen4x3"/>
   <p:notesSz cx="6858000" cy="9144000"/>
@@ -5259,6 +5260,160 @@
     <p:extLst>
       <p:ext uri="{BB962C8B-B14F-4D97-AF65-F5344CB8AC3E}">
         <p14:creationId xmlns:p14="http://schemas.microsoft.com/office/powerpoint/2010/main" val="1540331679"/>
+      </p:ext>
+    </p:extLst>
+  </p:cSld>
+  <p:clrMapOvr>
+    <a:masterClrMapping/>
+  </p:clrMapOvr>
+</p:sld>
+</file>
+
+<file path=ppt/slides/slide3.xml><?xml version="1.0" encoding="utf-8"?>
+<p:sld xmlns:a="http://schemas.openxmlformats.org/drawingml/2006/main" xmlns:r="http://schemas.openxmlformats.org/officeDocument/2006/relationships" xmlns:p="http://schemas.openxmlformats.org/presentationml/2006/main">
+  <p:cSld>
+    <p:spTree>
+      <p:nvGrpSpPr>
+        <p:cNvPr id="1" name=""/>
+        <p:cNvGrpSpPr/>
+        <p:nvPr/>
+      </p:nvGrpSpPr>
+      <p:grpSpPr>
+        <a:xfrm>
+          <a:off x="0" y="0"/>
+          <a:ext cx="0" cy="0"/>
+          <a:chOff x="0" y="0"/>
+          <a:chExt cx="0" cy="0"/>
+        </a:xfrm>
+      </p:grpSpPr>
+      <p:sp>
+        <p:nvSpPr>
+          <p:cNvPr id="2" name="Title 1">
+            <a:extLst>
+              <a:ext uri="{FF2B5EF4-FFF2-40B4-BE49-F238E27FC236}">
+                <a16:creationId xmlns:a16="http://schemas.microsoft.com/office/drawing/2014/main" id="{54477F14-8FA0-FC48-86EA-E641AECCF1CE}"/>
+              </a:ext>
+            </a:extLst>
+          </p:cNvPr>
+          <p:cNvSpPr>
+            <a:spLocks noGrp="1"/>
+          </p:cNvSpPr>
+          <p:nvPr>
+            <p:ph type="title"/>
+          </p:nvPr>
+        </p:nvSpPr>
+        <p:spPr/>
+        <p:txBody>
+          <a:bodyPr/>
+          <a:lstStyle/>
+          <a:p>
+            <a:r>
+              <a:rPr lang="en-US"/>
+              <a:t>Leaf Interface</a:t>
+            </a:r>
+          </a:p>
+        </p:txBody>
+      </p:sp>
+      <p:pic>
+        <p:nvPicPr>
+          <p:cNvPr id="7" name="Content Placeholder 6">
+            <a:extLst>
+              <a:ext uri="{FF2B5EF4-FFF2-40B4-BE49-F238E27FC236}">
+                <a16:creationId xmlns:a16="http://schemas.microsoft.com/office/drawing/2014/main" id="{61541400-CAB1-CB43-AD62-A3B723E1D277}"/>
+              </a:ext>
+            </a:extLst>
+          </p:cNvPr>
+          <p:cNvPicPr>
+            <a:picLocks noGrp="1" noChangeAspect="1"/>
+          </p:cNvPicPr>
+          <p:nvPr>
+            <p:ph idx="1"/>
+          </p:nvPr>
+        </p:nvPicPr>
+        <p:blipFill>
+          <a:blip r:embed="rId2"/>
+          <a:stretch>
+            <a:fillRect/>
+          </a:stretch>
+        </p:blipFill>
+        <p:spPr>
+          <a:xfrm>
+            <a:off x="1909482" y="1981200"/>
+            <a:ext cx="5325035" cy="4114800"/>
+          </a:xfrm>
+        </p:spPr>
+      </p:pic>
+      <p:sp>
+        <p:nvSpPr>
+          <p:cNvPr id="4" name="Date Placeholder 3">
+            <a:extLst>
+              <a:ext uri="{FF2B5EF4-FFF2-40B4-BE49-F238E27FC236}">
+                <a16:creationId xmlns:a16="http://schemas.microsoft.com/office/drawing/2014/main" id="{FEA42A1B-5F38-9142-9D90-0FB3713CFF45}"/>
+              </a:ext>
+            </a:extLst>
+          </p:cNvPr>
+          <p:cNvSpPr>
+            <a:spLocks noGrp="1"/>
+          </p:cNvSpPr>
+          <p:nvPr>
+            <p:ph type="dt" sz="half" idx="10"/>
+          </p:nvPr>
+        </p:nvSpPr>
+        <p:spPr/>
+        <p:txBody>
+          <a:bodyPr/>
+          <a:lstStyle/>
+          <a:p>
+            <a:pPr>
+              <a:defRPr/>
+            </a:pPr>
+            <a:r>
+              <a:rPr lang="en-US"/>
+              <a:t>Penn ESE532 Fall 2018 -- DeHon</a:t>
+            </a:r>
+            <a:endParaRPr lang="en-US" dirty="0"/>
+          </a:p>
+        </p:txBody>
+      </p:sp>
+      <p:sp>
+        <p:nvSpPr>
+          <p:cNvPr id="5" name="Slide Number Placeholder 4">
+            <a:extLst>
+              <a:ext uri="{FF2B5EF4-FFF2-40B4-BE49-F238E27FC236}">
+                <a16:creationId xmlns:a16="http://schemas.microsoft.com/office/drawing/2014/main" id="{84C64690-852B-154D-A8EB-9BD86E374037}"/>
+              </a:ext>
+            </a:extLst>
+          </p:cNvPr>
+          <p:cNvSpPr>
+            <a:spLocks noGrp="1"/>
+          </p:cNvSpPr>
+          <p:nvPr>
+            <p:ph type="sldNum" sz="quarter" idx="12"/>
+          </p:nvPr>
+        </p:nvSpPr>
+        <p:spPr/>
+        <p:txBody>
+          <a:bodyPr/>
+          <a:lstStyle/>
+          <a:p>
+            <a:pPr>
+              <a:defRPr/>
+            </a:pPr>
+            <a:fld id="{4AFB57DF-B8E1-6E4E-A23B-D02022E33D11}" type="slidenum">
+              <a:rPr lang="en-US" smtClean="0"/>
+              <a:pPr>
+                <a:defRPr/>
+              </a:pPr>
+              <a:t>3</a:t>
+            </a:fld>
+            <a:endParaRPr lang="en-US"/>
+          </a:p>
+        </p:txBody>
+      </p:sp>
+    </p:spTree>
+    <p:extLst>
+      <p:ext uri="{BB962C8B-B14F-4D97-AF65-F5344CB8AC3E}">
+        <p14:creationId xmlns:p14="http://schemas.microsoft.com/office/powerpoint/2010/main" val="536728441"/>
       </p:ext>
     </p:extLst>
   </p:cSld>

</xml_diff>